<commit_message>
did a few changes and added script
</commit_message>
<xml_diff>
--- a/presentation.pptx
+++ b/presentation.pptx
@@ -361,7 +361,7 @@
           <a:p>
             <a:fld id="{3E4499F5-70C7-4B80-98E9-84E6A0F06D73}" type="slidenum">
               <a:rPr lang="pt-PT" smtClean="0"/>
-              <a:t>‹nº›</a:t>
+              <a:t>‹#›</a:t>
             </a:fld>
             <a:endParaRPr lang="pt-PT"/>
           </a:p>
@@ -1392,7 +1392,7 @@
           <a:p>
             <a:fld id="{D57F1E4F-1CFF-5643-939E-02111984F565}" type="slidenum">
               <a:rPr lang="en-US" dirty="0"/>
-              <a:t>‹nº›</a:t>
+              <a:t>‹#›</a:t>
             </a:fld>
             <a:endParaRPr lang="en-US" dirty="0"/>
           </a:p>
@@ -1662,7 +1662,7 @@
           <a:p>
             <a:fld id="{D57F1E4F-1CFF-5643-939E-02111984F565}" type="slidenum">
               <a:rPr lang="en-US" dirty="0"/>
-              <a:t>‹nº›</a:t>
+              <a:t>‹#›</a:t>
             </a:fld>
             <a:endParaRPr lang="en-US" dirty="0"/>
           </a:p>
@@ -1851,7 +1851,7 @@
           <a:p>
             <a:fld id="{D57F1E4F-1CFF-5643-939E-02111984F565}" type="slidenum">
               <a:rPr lang="en-US" dirty="0"/>
-              <a:t>‹nº›</a:t>
+              <a:t>‹#›</a:t>
             </a:fld>
             <a:endParaRPr lang="en-US" dirty="0"/>
           </a:p>
@@ -2119,7 +2119,7 @@
           <a:p>
             <a:fld id="{D57F1E4F-1CFF-5643-939E-02111984F565}" type="slidenum">
               <a:rPr lang="en-US" dirty="0"/>
-              <a:t>‹nº›</a:t>
+              <a:t>‹#›</a:t>
             </a:fld>
             <a:endParaRPr lang="en-US" dirty="0"/>
           </a:p>
@@ -2455,7 +2455,7 @@
           <a:p>
             <a:fld id="{D57F1E4F-1CFF-5643-939E-02111984F565}" type="slidenum">
               <a:rPr lang="en-US" dirty="0"/>
-              <a:t>‹nº›</a:t>
+              <a:t>‹#›</a:t>
             </a:fld>
             <a:endParaRPr lang="en-US" dirty="0"/>
           </a:p>
@@ -3073,7 +3073,7 @@
           <a:p>
             <a:fld id="{D57F1E4F-1CFF-5643-939E-02111984F565}" type="slidenum">
               <a:rPr lang="en-US" dirty="0"/>
-              <a:t>‹nº›</a:t>
+              <a:t>‹#›</a:t>
             </a:fld>
             <a:endParaRPr lang="en-US" dirty="0"/>
           </a:p>
@@ -3928,7 +3928,7 @@
           <a:p>
             <a:fld id="{D57F1E4F-1CFF-5643-939E-02111984F565}" type="slidenum">
               <a:rPr lang="en-US" dirty="0"/>
-              <a:t>‹nº›</a:t>
+              <a:t>‹#›</a:t>
             </a:fld>
             <a:endParaRPr lang="en-US" dirty="0"/>
           </a:p>
@@ -4093,7 +4093,7 @@
           <a:p>
             <a:fld id="{D57F1E4F-1CFF-5643-939E-02111984F565}" type="slidenum">
               <a:rPr lang="en-US" dirty="0"/>
-              <a:t>‹nº›</a:t>
+              <a:t>‹#›</a:t>
             </a:fld>
             <a:endParaRPr lang="en-US" dirty="0"/>
           </a:p>
@@ -4268,7 +4268,7 @@
           <a:p>
             <a:fld id="{D57F1E4F-1CFF-5643-939E-02111984F565}" type="slidenum">
               <a:rPr lang="en-US" dirty="0"/>
-              <a:t>‹nº›</a:t>
+              <a:t>‹#›</a:t>
             </a:fld>
             <a:endParaRPr lang="en-US" dirty="0"/>
           </a:p>
@@ -4433,7 +4433,7 @@
           <a:p>
             <a:fld id="{D57F1E4F-1CFF-5643-939E-02111984F565}" type="slidenum">
               <a:rPr lang="en-US" dirty="0"/>
-              <a:t>‹nº›</a:t>
+              <a:t>‹#›</a:t>
             </a:fld>
             <a:endParaRPr lang="en-US" dirty="0"/>
           </a:p>
@@ -4675,7 +4675,7 @@
           <a:p>
             <a:fld id="{D57F1E4F-1CFF-5643-939E-02111984F565}" type="slidenum">
               <a:rPr lang="en-US" dirty="0"/>
-              <a:t>‹nº›</a:t>
+              <a:t>‹#›</a:t>
             </a:fld>
             <a:endParaRPr lang="en-US" dirty="0"/>
           </a:p>
@@ -4962,7 +4962,7 @@
           <a:p>
             <a:fld id="{D57F1E4F-1CFF-5643-939E-02111984F565}" type="slidenum">
               <a:rPr lang="en-US" dirty="0"/>
-              <a:t>‹nº›</a:t>
+              <a:t>‹#›</a:t>
             </a:fld>
             <a:endParaRPr lang="en-US" dirty="0"/>
           </a:p>
@@ -5401,7 +5401,7 @@
           <a:p>
             <a:fld id="{D57F1E4F-1CFF-5643-939E-02111984F565}" type="slidenum">
               <a:rPr lang="en-US" dirty="0"/>
-              <a:t>‹nº›</a:t>
+              <a:t>‹#›</a:t>
             </a:fld>
             <a:endParaRPr lang="en-US" dirty="0"/>
           </a:p>
@@ -5514,7 +5514,7 @@
           <a:p>
             <a:fld id="{D57F1E4F-1CFF-5643-939E-02111984F565}" type="slidenum">
               <a:rPr lang="en-US" dirty="0"/>
-              <a:t>‹nº›</a:t>
+              <a:t>‹#›</a:t>
             </a:fld>
             <a:endParaRPr lang="en-US" dirty="0"/>
           </a:p>
@@ -5604,7 +5604,7 @@
           <a:p>
             <a:fld id="{D57F1E4F-1CFF-5643-939E-02111984F565}" type="slidenum">
               <a:rPr lang="en-US" dirty="0"/>
-              <a:t>‹nº›</a:t>
+              <a:t>‹#›</a:t>
             </a:fld>
             <a:endParaRPr lang="en-US" dirty="0"/>
           </a:p>
@@ -5878,7 +5878,7 @@
           <a:p>
             <a:fld id="{D57F1E4F-1CFF-5643-939E-02111984F565}" type="slidenum">
               <a:rPr lang="en-US" dirty="0"/>
-              <a:t>‹nº›</a:t>
+              <a:t>‹#›</a:t>
             </a:fld>
             <a:endParaRPr lang="en-US" dirty="0"/>
           </a:p>
@@ -6148,7 +6148,7 @@
           <a:p>
             <a:fld id="{D57F1E4F-1CFF-5643-939E-02111984F565}" type="slidenum">
               <a:rPr lang="en-US" dirty="0"/>
-              <a:t>‹nº›</a:t>
+              <a:t>‹#›</a:t>
             </a:fld>
             <a:endParaRPr lang="en-US" dirty="0"/>
           </a:p>
@@ -6609,7 +6609,7 @@
           <a:p>
             <a:fld id="{D57F1E4F-1CFF-5643-939E-02111984F565}" type="slidenum">
               <a:rPr lang="en-US" dirty="0"/>
-              <a:t>‹nº›</a:t>
+              <a:t>‹#›</a:t>
             </a:fld>
             <a:endParaRPr lang="en-US" dirty="0"/>
           </a:p>
@@ -7138,7 +7138,7 @@
           <p:cNvPr id="12" name="Agrupar 11">
             <a:extLst>
               <a:ext uri="{FF2B5EF4-FFF2-40B4-BE49-F238E27FC236}">
-                <a16:creationId xmlns:a16="http://schemas.microsoft.com/office/drawing/2014/main" id="{FC2A7235-27BF-4464-89A0-E61C0CC8C7ED}"/>
+                <a16:creationId xmlns:a16="http://schemas.microsoft.com/office/drawing/2014/main" xmlns="" id="{FC2A7235-27BF-4464-89A0-E61C0CC8C7ED}"/>
               </a:ext>
             </a:extLst>
           </p:cNvPr>
@@ -7158,7 +7158,7 @@
             <p:cNvPr id="7" name="Retângulo 6">
               <a:extLst>
                 <a:ext uri="{FF2B5EF4-FFF2-40B4-BE49-F238E27FC236}">
-                  <a16:creationId xmlns:a16="http://schemas.microsoft.com/office/drawing/2014/main" id="{3536D763-8F7F-4299-BF1F-2F4700353BE9}"/>
+                  <a16:creationId xmlns:a16="http://schemas.microsoft.com/office/drawing/2014/main" xmlns="" id="{3536D763-8F7F-4299-BF1F-2F4700353BE9}"/>
                 </a:ext>
               </a:extLst>
             </p:cNvPr>
@@ -7212,7 +7212,7 @@
             <p:cNvPr id="10" name="Imagem 9">
               <a:extLst>
                 <a:ext uri="{FF2B5EF4-FFF2-40B4-BE49-F238E27FC236}">
-                  <a16:creationId xmlns:a16="http://schemas.microsoft.com/office/drawing/2014/main" id="{EE120ED8-F510-428F-8E2B-8FB7801ED686}"/>
+                  <a16:creationId xmlns:a16="http://schemas.microsoft.com/office/drawing/2014/main" xmlns="" id="{EE120ED8-F510-428F-8E2B-8FB7801ED686}"/>
                 </a:ext>
               </a:extLst>
             </p:cNvPr>
@@ -7243,7 +7243,7 @@
           <p:cNvPr id="11" name="CaixaDeTexto 10">
             <a:extLst>
               <a:ext uri="{FF2B5EF4-FFF2-40B4-BE49-F238E27FC236}">
-                <a16:creationId xmlns:a16="http://schemas.microsoft.com/office/drawing/2014/main" id="{B56E9F45-F09B-4BD0-98B3-EC2ADC5C4F07}"/>
+                <a16:creationId xmlns:a16="http://schemas.microsoft.com/office/drawing/2014/main" xmlns="" id="{B56E9F45-F09B-4BD0-98B3-EC2ADC5C4F07}"/>
               </a:ext>
             </a:extLst>
           </p:cNvPr>
@@ -7295,6 +7295,13 @@
   <p:clrMapOvr>
     <a:masterClrMapping/>
   </p:clrMapOvr>
+  <p:timing>
+    <p:tnLst>
+      <p:par>
+        <p:cTn id="1" dur="indefinite" restart="never" nodeType="tmRoot"/>
+      </p:par>
+    </p:tnLst>
+  </p:timing>
 </p:sld>
 </file>
 
@@ -7351,7 +7358,7 @@
           <p:cNvPr id="4" name="Marcador de Posição do Texto 3">
             <a:extLst>
               <a:ext uri="{FF2B5EF4-FFF2-40B4-BE49-F238E27FC236}">
-                <a16:creationId xmlns:a16="http://schemas.microsoft.com/office/drawing/2014/main" id="{395FDA90-928D-490B-9205-8969FC300942}"/>
+                <a16:creationId xmlns:a16="http://schemas.microsoft.com/office/drawing/2014/main" xmlns="" id="{395FDA90-928D-490B-9205-8969FC300942}"/>
               </a:ext>
             </a:extLst>
           </p:cNvPr>
@@ -7396,167 +7403,16 @@
           <a:lstStyle/>
           <a:p>
             <a:r>
-              <a:rPr lang="pt-PT" sz="2400" dirty="0" err="1"/>
-              <a:t>The</a:t>
-            </a:r>
-            <a:r>
-              <a:rPr lang="pt-PT" sz="2400" dirty="0"/>
-              <a:t> </a:t>
-            </a:r>
-            <a:r>
-              <a:rPr lang="pt-PT" sz="2400" dirty="0" err="1"/>
-              <a:t>lack</a:t>
-            </a:r>
-            <a:r>
-              <a:rPr lang="pt-PT" sz="2400" dirty="0"/>
-              <a:t> </a:t>
-            </a:r>
-            <a:r>
-              <a:rPr lang="pt-PT" sz="2400" dirty="0" err="1"/>
-              <a:t>of</a:t>
-            </a:r>
-            <a:r>
-              <a:rPr lang="pt-PT" sz="2400" dirty="0"/>
-              <a:t> </a:t>
-            </a:r>
-            <a:r>
-              <a:rPr lang="pt-PT" sz="2400" dirty="0" err="1"/>
-              <a:t>concise</a:t>
-            </a:r>
-            <a:r>
-              <a:rPr lang="pt-PT" sz="2400" dirty="0"/>
-              <a:t> </a:t>
-            </a:r>
-            <a:r>
-              <a:rPr lang="pt-PT" sz="2400" dirty="0" err="1"/>
-              <a:t>and</a:t>
-            </a:r>
-            <a:r>
-              <a:rPr lang="pt-PT" sz="2400" dirty="0"/>
-              <a:t> </a:t>
-            </a:r>
-            <a:r>
-              <a:rPr lang="pt-PT" sz="2400" dirty="0" err="1"/>
-              <a:t>simple</a:t>
-            </a:r>
-            <a:r>
-              <a:rPr lang="pt-PT" sz="2400" dirty="0"/>
-              <a:t> </a:t>
-            </a:r>
-            <a:r>
-              <a:rPr lang="pt-PT" sz="2400" dirty="0" err="1"/>
-              <a:t>introductions</a:t>
-            </a:r>
-            <a:r>
-              <a:rPr lang="pt-PT" sz="2400" dirty="0"/>
-              <a:t> to GPGPU</a:t>
-            </a:r>
-          </a:p>
-          <a:p>
-            <a:r>
-              <a:rPr lang="pt-PT" sz="2400" dirty="0" err="1"/>
-              <a:t>The</a:t>
-            </a:r>
-            <a:r>
-              <a:rPr lang="pt-PT" sz="2400" dirty="0"/>
-              <a:t> </a:t>
-            </a:r>
-            <a:r>
-              <a:rPr lang="pt-PT" sz="2400" dirty="0" err="1"/>
-              <a:t>abserce</a:t>
-            </a:r>
-            <a:r>
-              <a:rPr lang="pt-PT" sz="2400" dirty="0"/>
-              <a:t> </a:t>
-            </a:r>
-            <a:r>
-              <a:rPr lang="pt-PT" sz="2400" dirty="0" err="1"/>
-              <a:t>of</a:t>
-            </a:r>
-            <a:r>
-              <a:rPr lang="pt-PT" sz="2400" dirty="0"/>
-              <a:t> </a:t>
-            </a:r>
-            <a:r>
-              <a:rPr lang="pt-PT" sz="2400" dirty="0" err="1"/>
-              <a:t>content</a:t>
-            </a:r>
-            <a:r>
-              <a:rPr lang="pt-PT" sz="2400" dirty="0"/>
-              <a:t> </a:t>
-            </a:r>
-            <a:r>
-              <a:rPr lang="pt-PT" sz="2400" dirty="0" err="1"/>
-              <a:t>where</a:t>
-            </a:r>
-            <a:r>
-              <a:rPr lang="pt-PT" sz="2400" dirty="0"/>
-              <a:t> </a:t>
-            </a:r>
-            <a:r>
-              <a:rPr lang="pt-PT" sz="2400" dirty="0" err="1"/>
-              <a:t>it</a:t>
-            </a:r>
-            <a:r>
-              <a:rPr lang="pt-PT" sz="2400" dirty="0"/>
-              <a:t> can </a:t>
-            </a:r>
-            <a:r>
-              <a:rPr lang="pt-PT" sz="2400" dirty="0" err="1"/>
-              <a:t>be</a:t>
-            </a:r>
-            <a:r>
-              <a:rPr lang="pt-PT" sz="2400" dirty="0"/>
-              <a:t> </a:t>
-            </a:r>
-            <a:r>
-              <a:rPr lang="pt-PT" sz="2400" dirty="0" err="1"/>
-              <a:t>shown</a:t>
-            </a:r>
-            <a:r>
-              <a:rPr lang="pt-PT" sz="2400" dirty="0"/>
-              <a:t> some </a:t>
-            </a:r>
-            <a:r>
-              <a:rPr lang="pt-PT" sz="2400" dirty="0" err="1"/>
-              <a:t>of</a:t>
-            </a:r>
-            <a:r>
-              <a:rPr lang="pt-PT" sz="2400" dirty="0"/>
-              <a:t> </a:t>
-            </a:r>
-            <a:r>
-              <a:rPr lang="pt-PT" sz="2400" dirty="0" err="1"/>
-              <a:t>the</a:t>
-            </a:r>
-            <a:r>
-              <a:rPr lang="pt-PT" sz="2400" dirty="0"/>
-              <a:t> </a:t>
-            </a:r>
-            <a:r>
-              <a:rPr lang="pt-PT" sz="2400" dirty="0" err="1"/>
-              <a:t>improvements</a:t>
-            </a:r>
-            <a:r>
-              <a:rPr lang="pt-PT" sz="2400" dirty="0"/>
-              <a:t> </a:t>
-            </a:r>
-            <a:r>
-              <a:rPr lang="pt-PT" sz="2400" dirty="0" err="1"/>
-              <a:t>when</a:t>
-            </a:r>
-            <a:r>
-              <a:rPr lang="pt-PT" sz="2400" dirty="0"/>
-              <a:t> </a:t>
-            </a:r>
-            <a:r>
-              <a:rPr lang="pt-PT" sz="2400" dirty="0" err="1"/>
-              <a:t>using</a:t>
-            </a:r>
-            <a:r>
-              <a:rPr lang="pt-PT" sz="2400" dirty="0"/>
-              <a:t> GPGPU</a:t>
-            </a:r>
+              <a:rPr lang="en-GB" sz="2400" dirty="0" smtClean="0"/>
+              <a:t>The lack of concise and simple introductions to GPGPU</a:t>
+            </a:r>
+          </a:p>
+          <a:p>
+            <a:r>
+              <a:rPr lang="en-GB" sz="2400" dirty="0" smtClean="0"/>
+              <a:t>The absence of content where it can be shown some of the improvements when using GPGPU</a:t>
+            </a:r>
+            <a:endParaRPr lang="en-GB" sz="2400" dirty="0"/>
           </a:p>
         </p:txBody>
       </p:sp>
@@ -7565,7 +7421,7 @@
           <p:cNvPr id="5" name="Marcador de Posição do Texto 4">
             <a:extLst>
               <a:ext uri="{FF2B5EF4-FFF2-40B4-BE49-F238E27FC236}">
-                <a16:creationId xmlns:a16="http://schemas.microsoft.com/office/drawing/2014/main" id="{B606F5B3-55F1-4AF6-93F1-FAC926D4A149}"/>
+                <a16:creationId xmlns:a16="http://schemas.microsoft.com/office/drawing/2014/main" xmlns="" id="{B606F5B3-55F1-4AF6-93F1-FAC926D4A149}"/>
               </a:ext>
             </a:extLst>
           </p:cNvPr>
@@ -7597,7 +7453,7 @@
           <p:cNvPr id="6" name="Marcador de Posição de Conteúdo 5">
             <a:extLst>
               <a:ext uri="{FF2B5EF4-FFF2-40B4-BE49-F238E27FC236}">
-                <a16:creationId xmlns:a16="http://schemas.microsoft.com/office/drawing/2014/main" id="{8B8A2FC8-CFF6-4995-AE1C-CB0B7BDB5770}"/>
+                <a16:creationId xmlns:a16="http://schemas.microsoft.com/office/drawing/2014/main" xmlns="" id="{8B8A2FC8-CFF6-4995-AE1C-CB0B7BDB5770}"/>
               </a:ext>
             </a:extLst>
           </p:cNvPr>
@@ -7616,97 +7472,10 @@
           <a:lstStyle/>
           <a:p>
             <a:r>
-              <a:rPr lang="pt-PT" sz="2400" dirty="0"/>
-              <a:t>To </a:t>
-            </a:r>
-            <a:r>
-              <a:rPr lang="pt-PT" sz="2400" dirty="0" err="1"/>
-              <a:t>provide</a:t>
-            </a:r>
-            <a:r>
-              <a:rPr lang="pt-PT" sz="2400" dirty="0"/>
-              <a:t> </a:t>
-            </a:r>
-            <a:r>
-              <a:rPr lang="pt-PT" sz="2400" dirty="0" err="1"/>
-              <a:t>an</a:t>
-            </a:r>
-            <a:r>
-              <a:rPr lang="pt-PT" sz="2400" dirty="0"/>
-              <a:t> </a:t>
-            </a:r>
-            <a:r>
-              <a:rPr lang="pt-PT" sz="2400" dirty="0" err="1"/>
-              <a:t>informative</a:t>
-            </a:r>
-            <a:r>
-              <a:rPr lang="pt-PT" sz="2400" dirty="0"/>
-              <a:t> </a:t>
-            </a:r>
-            <a:r>
-              <a:rPr lang="pt-PT" sz="2400" dirty="0" err="1"/>
-              <a:t>and</a:t>
-            </a:r>
-            <a:r>
-              <a:rPr lang="pt-PT" sz="2400" dirty="0"/>
-              <a:t> </a:t>
-            </a:r>
-            <a:r>
-              <a:rPr lang="pt-PT" sz="2400" dirty="0" err="1"/>
-              <a:t>educative</a:t>
-            </a:r>
-            <a:r>
-              <a:rPr lang="pt-PT" sz="2400" dirty="0"/>
-              <a:t> </a:t>
-            </a:r>
-            <a:r>
-              <a:rPr lang="pt-PT" sz="2400" dirty="0" err="1"/>
-              <a:t>introduction</a:t>
-            </a:r>
-            <a:r>
-              <a:rPr lang="pt-PT" sz="2400" dirty="0"/>
-              <a:t> to GPGPU, </a:t>
-            </a:r>
-            <a:r>
-              <a:rPr lang="pt-PT" sz="2400" dirty="0" err="1"/>
-              <a:t>using</a:t>
-            </a:r>
-            <a:r>
-              <a:rPr lang="pt-PT" sz="2400" dirty="0"/>
-              <a:t> </a:t>
-            </a:r>
-            <a:r>
-              <a:rPr lang="pt-PT" sz="2400" dirty="0" err="1"/>
-              <a:t>the</a:t>
-            </a:r>
-            <a:r>
-              <a:rPr lang="pt-PT" sz="2400" dirty="0"/>
-              <a:t> </a:t>
-            </a:r>
-            <a:r>
-              <a:rPr lang="pt-PT" sz="2400" dirty="0" err="1"/>
-              <a:t>Floyd&amp;Warshall</a:t>
-            </a:r>
-            <a:r>
-              <a:rPr lang="pt-PT" sz="2400" dirty="0"/>
-              <a:t> </a:t>
-            </a:r>
-            <a:r>
-              <a:rPr lang="pt-PT" sz="2400" dirty="0" err="1"/>
-              <a:t>algorithm</a:t>
-            </a:r>
-            <a:r>
-              <a:rPr lang="pt-PT" sz="2400" dirty="0"/>
-              <a:t> in CUDA as </a:t>
-            </a:r>
-            <a:r>
-              <a:rPr lang="pt-PT" sz="2400" dirty="0" err="1"/>
-              <a:t>an</a:t>
-            </a:r>
-            <a:r>
-              <a:rPr lang="pt-PT" sz="2400" dirty="0"/>
-              <a:t> exemple</a:t>
-            </a:r>
+              <a:rPr lang="en-GB" sz="2400" dirty="0" smtClean="0"/>
+              <a:t>To provide an informative and educative introduction to GPGPU, using the Floyd Warshall algorithm in CUDA as an example</a:t>
+            </a:r>
+            <a:endParaRPr lang="en-GB" sz="2400" dirty="0"/>
           </a:p>
         </p:txBody>
       </p:sp>
@@ -7720,6 +7489,13 @@
   <p:clrMapOvr>
     <a:masterClrMapping/>
   </p:clrMapOvr>
+  <p:timing>
+    <p:tnLst>
+      <p:par>
+        <p:cTn id="1" dur="indefinite" restart="never" nodeType="tmRoot"/>
+      </p:par>
+    </p:tnLst>
+  </p:timing>
 </p:sld>
 </file>
 
@@ -7779,84 +7555,51 @@
           <a:lstStyle/>
           <a:p>
             <a:r>
-              <a:rPr lang="pt-PT" sz="2800" dirty="0"/>
-              <a:t>Incremental </a:t>
-            </a:r>
-            <a:r>
-              <a:rPr lang="pt-PT" sz="2800" dirty="0" err="1"/>
-              <a:t>Development</a:t>
-            </a:r>
-            <a:endParaRPr lang="pt-PT" sz="2800" dirty="0"/>
-          </a:p>
-          <a:p>
-            <a:r>
-              <a:rPr lang="pt-PT" sz="2800" dirty="0" err="1"/>
-              <a:t>Implemented</a:t>
-            </a:r>
-            <a:r>
-              <a:rPr lang="pt-PT" sz="2800" dirty="0"/>
-              <a:t> </a:t>
-            </a:r>
-            <a:r>
-              <a:rPr lang="pt-PT" sz="2800" dirty="0" err="1"/>
-              <a:t>the</a:t>
-            </a:r>
-            <a:r>
-              <a:rPr lang="pt-PT" sz="2800" dirty="0"/>
-              <a:t> </a:t>
-            </a:r>
-            <a:r>
-              <a:rPr lang="pt-PT" sz="2800" dirty="0" err="1"/>
-              <a:t>following</a:t>
-            </a:r>
-            <a:endParaRPr lang="pt-PT" sz="2800" dirty="0"/>
+              <a:rPr lang="en-GB" sz="2800" dirty="0" smtClean="0"/>
+              <a:t>Incremental Development</a:t>
+            </a:r>
+          </a:p>
+          <a:p>
+            <a:r>
+              <a:rPr lang="en-GB" sz="2800" dirty="0" smtClean="0"/>
+              <a:t>Implemented the following</a:t>
+            </a:r>
           </a:p>
           <a:p>
             <a:pPr lvl="1"/>
             <a:r>
-              <a:rPr lang="pt-PT" sz="2000" dirty="0"/>
-              <a:t>Sequencial CPU</a:t>
+              <a:rPr lang="en-GB" sz="2000" dirty="0" smtClean="0"/>
+              <a:t>Sequential CPU</a:t>
             </a:r>
           </a:p>
           <a:p>
             <a:pPr lvl="1"/>
             <a:r>
-              <a:rPr lang="pt-PT" sz="2000" dirty="0"/>
-              <a:t>Sequencial GPU</a:t>
+              <a:rPr lang="en-GB" sz="2000" dirty="0" smtClean="0"/>
+              <a:t>Sequential GPU</a:t>
             </a:r>
           </a:p>
           <a:p>
             <a:pPr lvl="1"/>
             <a:r>
-              <a:rPr lang="pt-PT" sz="2000" dirty="0" err="1"/>
-              <a:t>Parallel</a:t>
-            </a:r>
-            <a:r>
-              <a:rPr lang="pt-PT" sz="2000" dirty="0"/>
-              <a:t> GPU</a:t>
+              <a:rPr lang="en-GB" sz="2000" dirty="0" smtClean="0"/>
+              <a:t>Parallel GPU</a:t>
             </a:r>
           </a:p>
           <a:p>
             <a:pPr lvl="1"/>
             <a:r>
-              <a:rPr lang="pt-PT" sz="2000" dirty="0" err="1"/>
-              <a:t>Synchronization</a:t>
-            </a:r>
-            <a:r>
-              <a:rPr lang="pt-PT" sz="2000" dirty="0"/>
-              <a:t> GPU</a:t>
+              <a:rPr lang="en-GB" sz="2000" dirty="0" smtClean="0"/>
+              <a:t>Synchronization GPU</a:t>
             </a:r>
           </a:p>
           <a:p>
             <a:pPr lvl="1"/>
             <a:r>
-              <a:rPr lang="pt-PT" sz="2000" dirty="0" err="1"/>
-              <a:t>Memory</a:t>
-            </a:r>
-            <a:r>
-              <a:rPr lang="pt-PT" sz="2000" dirty="0"/>
-              <a:t> GPU</a:t>
-            </a:r>
+              <a:rPr lang="en-GB" sz="2000" dirty="0" smtClean="0"/>
+              <a:t>Memory GPU</a:t>
+            </a:r>
+            <a:endParaRPr lang="en-GB" sz="2000" dirty="0"/>
           </a:p>
         </p:txBody>
       </p:sp>
@@ -7870,6 +7613,13 @@
   <p:clrMapOvr>
     <a:masterClrMapping/>
   </p:clrMapOvr>
+  <p:timing>
+    <p:tnLst>
+      <p:par>
+        <p:cTn id="1" dur="indefinite" restart="never" nodeType="tmRoot"/>
+      </p:par>
+    </p:tnLst>
+  </p:timing>
 </p:sld>
 </file>
 
@@ -7939,209 +7689,16 @@
           <a:lstStyle/>
           <a:p>
             <a:r>
-              <a:rPr lang="pt-PT" sz="2800" dirty="0" err="1"/>
-              <a:t>The</a:t>
-            </a:r>
-            <a:r>
-              <a:rPr lang="pt-PT" sz="2800" dirty="0"/>
-              <a:t> </a:t>
-            </a:r>
-            <a:r>
-              <a:rPr lang="pt-PT" sz="2800" dirty="0" err="1"/>
-              <a:t>choosen</a:t>
-            </a:r>
-            <a:r>
-              <a:rPr lang="pt-PT" sz="2800" dirty="0"/>
-              <a:t> </a:t>
-            </a:r>
-            <a:r>
-              <a:rPr lang="pt-PT" sz="2800" dirty="0" err="1"/>
-              <a:t>tools</a:t>
-            </a:r>
-            <a:r>
-              <a:rPr lang="pt-PT" sz="2800" dirty="0"/>
-              <a:t> to </a:t>
-            </a:r>
-            <a:r>
-              <a:rPr lang="pt-PT" sz="2800" dirty="0" err="1"/>
-              <a:t>present</a:t>
-            </a:r>
-            <a:endParaRPr lang="pt-PT" sz="2800" dirty="0"/>
-          </a:p>
-          <a:p>
-            <a:r>
-              <a:rPr lang="pt-PT" sz="2800" dirty="0" err="1"/>
-              <a:t>How</a:t>
-            </a:r>
-            <a:r>
-              <a:rPr lang="pt-PT" sz="2800" dirty="0"/>
-              <a:t> to </a:t>
-            </a:r>
-            <a:r>
-              <a:rPr lang="pt-PT" sz="2800" dirty="0" err="1"/>
-              <a:t>explain</a:t>
-            </a:r>
-            <a:r>
-              <a:rPr lang="pt-PT" sz="2800" dirty="0"/>
-              <a:t> </a:t>
-            </a:r>
-            <a:r>
-              <a:rPr lang="pt-PT" sz="2800" dirty="0" err="1"/>
-              <a:t>them</a:t>
-            </a:r>
-            <a:r>
-              <a:rPr lang="pt-PT" sz="2800" dirty="0"/>
-              <a:t> </a:t>
-            </a:r>
-            <a:r>
-              <a:rPr lang="pt-PT" sz="2800" dirty="0" err="1"/>
-              <a:t>so</a:t>
-            </a:r>
-            <a:r>
-              <a:rPr lang="pt-PT" sz="2800" dirty="0"/>
-              <a:t> </a:t>
-            </a:r>
-            <a:r>
-              <a:rPr lang="pt-PT" sz="2800" dirty="0" err="1"/>
-              <a:t>that</a:t>
-            </a:r>
-            <a:r>
-              <a:rPr lang="pt-PT" sz="2800" dirty="0"/>
-              <a:t> </a:t>
-            </a:r>
-            <a:r>
-              <a:rPr lang="pt-PT" sz="2800" dirty="0" err="1"/>
-              <a:t>they</a:t>
-            </a:r>
-            <a:r>
-              <a:rPr lang="pt-PT" sz="2800" dirty="0"/>
-              <a:t> can </a:t>
-            </a:r>
-            <a:r>
-              <a:rPr lang="pt-PT" sz="2800" dirty="0" err="1"/>
-              <a:t>be</a:t>
-            </a:r>
-            <a:r>
-              <a:rPr lang="pt-PT" sz="2800" dirty="0"/>
-              <a:t> </a:t>
-            </a:r>
-            <a:r>
-              <a:rPr lang="pt-PT" sz="2800" dirty="0" err="1"/>
-              <a:t>interpreted</a:t>
-            </a:r>
-            <a:r>
-              <a:rPr lang="pt-PT" sz="2800" dirty="0"/>
-              <a:t> </a:t>
-            </a:r>
-            <a:r>
-              <a:rPr lang="pt-PT" sz="2800" dirty="0" err="1"/>
-              <a:t>and</a:t>
-            </a:r>
-            <a:r>
-              <a:rPr lang="pt-PT" sz="2800" dirty="0"/>
-              <a:t> </a:t>
-            </a:r>
-            <a:r>
-              <a:rPr lang="pt-PT" sz="2800" dirty="0" err="1"/>
-              <a:t>understood</a:t>
-            </a:r>
-            <a:r>
-              <a:rPr lang="pt-PT" sz="2800" dirty="0"/>
-              <a:t> </a:t>
-            </a:r>
-            <a:r>
-              <a:rPr lang="pt-PT" sz="2800" dirty="0" err="1"/>
-              <a:t>letting</a:t>
-            </a:r>
-            <a:r>
-              <a:rPr lang="pt-PT" sz="2800" dirty="0"/>
-              <a:t> </a:t>
-            </a:r>
-            <a:r>
-              <a:rPr lang="pt-PT" sz="2800" dirty="0" err="1"/>
-              <a:t>the</a:t>
-            </a:r>
-            <a:r>
-              <a:rPr lang="pt-PT" sz="2800" dirty="0"/>
-              <a:t> </a:t>
-            </a:r>
-            <a:r>
-              <a:rPr lang="pt-PT" sz="2800" dirty="0" err="1"/>
-              <a:t>reader</a:t>
-            </a:r>
-            <a:r>
-              <a:rPr lang="pt-PT" sz="2800" dirty="0"/>
-              <a:t> </a:t>
-            </a:r>
-            <a:r>
-              <a:rPr lang="pt-PT" sz="2800" dirty="0" err="1"/>
-              <a:t>with</a:t>
-            </a:r>
-            <a:r>
-              <a:rPr lang="pt-PT" sz="2800" dirty="0"/>
-              <a:t> </a:t>
-            </a:r>
-            <a:r>
-              <a:rPr lang="pt-PT" sz="2800" dirty="0" err="1"/>
-              <a:t>the</a:t>
-            </a:r>
-            <a:r>
-              <a:rPr lang="pt-PT" sz="2800" dirty="0"/>
-              <a:t> </a:t>
-            </a:r>
-            <a:r>
-              <a:rPr lang="pt-PT" sz="2800" dirty="0" err="1"/>
-              <a:t>capability</a:t>
-            </a:r>
-            <a:r>
-              <a:rPr lang="pt-PT" sz="2800" dirty="0"/>
-              <a:t> to </a:t>
-            </a:r>
-            <a:r>
-              <a:rPr lang="pt-PT" sz="2800" dirty="0" err="1"/>
-              <a:t>choose</a:t>
-            </a:r>
-            <a:r>
-              <a:rPr lang="pt-PT" sz="2800" dirty="0"/>
-              <a:t> </a:t>
-            </a:r>
-            <a:r>
-              <a:rPr lang="pt-PT" sz="2800" dirty="0" err="1"/>
-              <a:t>how</a:t>
-            </a:r>
-            <a:r>
-              <a:rPr lang="pt-PT" sz="2800" dirty="0"/>
-              <a:t> </a:t>
-            </a:r>
-            <a:r>
-              <a:rPr lang="pt-PT" sz="2800" dirty="0" err="1"/>
-              <a:t>and</a:t>
-            </a:r>
-            <a:r>
-              <a:rPr lang="pt-PT" sz="2800" dirty="0"/>
-              <a:t> </a:t>
-            </a:r>
-            <a:r>
-              <a:rPr lang="pt-PT" sz="2800" dirty="0" err="1"/>
-              <a:t>when</a:t>
-            </a:r>
-            <a:r>
-              <a:rPr lang="pt-PT" sz="2800" dirty="0"/>
-              <a:t> to </a:t>
-            </a:r>
-            <a:r>
-              <a:rPr lang="pt-PT" sz="2800" dirty="0" err="1"/>
-              <a:t>apply</a:t>
-            </a:r>
-            <a:r>
-              <a:rPr lang="pt-PT" sz="2800" dirty="0"/>
-              <a:t> </a:t>
-            </a:r>
-            <a:r>
-              <a:rPr lang="pt-PT" sz="2800" dirty="0" err="1"/>
-              <a:t>them</a:t>
-            </a:r>
-            <a:endParaRPr lang="pt-PT" sz="2800" dirty="0"/>
+              <a:rPr lang="en-GB" sz="2800" dirty="0" smtClean="0"/>
+              <a:t>The chosen tools to present</a:t>
+            </a:r>
+          </a:p>
+          <a:p>
+            <a:r>
+              <a:rPr lang="en-GB" sz="2800" dirty="0" smtClean="0"/>
+              <a:t>How to explain them so that they can be interpreted and understood letting the reader with the capability to choose how and when to apply them</a:t>
+            </a:r>
+            <a:endParaRPr lang="en-GB" sz="2800" dirty="0"/>
           </a:p>
         </p:txBody>
       </p:sp>
@@ -8155,6 +7712,13 @@
   <p:clrMapOvr>
     <a:masterClrMapping/>
   </p:clrMapOvr>
+  <p:timing>
+    <p:tnLst>
+      <p:par>
+        <p:cTn id="1" dur="indefinite" restart="never" nodeType="tmRoot"/>
+      </p:par>
+    </p:tnLst>
+  </p:timing>
 </p:sld>
 </file>
 
@@ -8203,7 +7767,7 @@
           <p:cNvPr id="5" name="Marcador de Posição de Conteúdo 4">
             <a:extLst>
               <a:ext uri="{FF2B5EF4-FFF2-40B4-BE49-F238E27FC236}">
-                <a16:creationId xmlns:a16="http://schemas.microsoft.com/office/drawing/2014/main" id="{F487D72A-6CC5-4817-BEBC-5356BCB4D8C7}"/>
+                <a16:creationId xmlns:a16="http://schemas.microsoft.com/office/drawing/2014/main" xmlns="" id="{F487D72A-6CC5-4817-BEBC-5356BCB4D8C7}"/>
               </a:ext>
             </a:extLst>
           </p:cNvPr>
@@ -8222,11 +7786,75 @@
         </p:blipFill>
         <p:spPr>
           <a:xfrm>
-            <a:off x="2283126" y="1596412"/>
-            <a:ext cx="7625747" cy="4434104"/>
+            <a:off x="646111" y="1963759"/>
+            <a:ext cx="6305556" cy="3666458"/>
           </a:xfrm>
         </p:spPr>
       </p:pic>
+      <p:sp>
+        <p:nvSpPr>
+          <p:cNvPr id="3" name="TextBox 2"/>
+          <p:cNvSpPr txBox="1"/>
+          <p:nvPr/>
+        </p:nvSpPr>
+        <p:spPr>
+          <a:xfrm>
+            <a:off x="7570573" y="1963759"/>
+            <a:ext cx="4382530" cy="1754326"/>
+          </a:xfrm>
+          <a:prstGeom prst="rect">
+            <a:avLst/>
+          </a:prstGeom>
+          <a:noFill/>
+        </p:spPr>
+        <p:txBody>
+          <a:bodyPr wrap="square" rtlCol="0">
+            <a:spAutoFit/>
+          </a:bodyPr>
+          <a:lstStyle/>
+          <a:p>
+            <a:pPr marL="285750" indent="-285750">
+              <a:buFont typeface="Wingdings" panose="05000000000000000000" pitchFamily="2" charset="2"/>
+              <a:buChar char="Ø"/>
+            </a:pPr>
+            <a:r>
+              <a:rPr lang="en-GB" dirty="0" smtClean="0"/>
+              <a:t>Improvements in every implementation</a:t>
+            </a:r>
+          </a:p>
+          <a:p>
+            <a:pPr marL="285750" indent="-285750">
+              <a:buFont typeface="Wingdings" panose="05000000000000000000" pitchFamily="2" charset="2"/>
+              <a:buChar char="Ø"/>
+            </a:pPr>
+            <a:endParaRPr lang="en-GB" dirty="0"/>
+          </a:p>
+          <a:p>
+            <a:pPr marL="285750" indent="-285750">
+              <a:buFont typeface="Wingdings" panose="05000000000000000000" pitchFamily="2" charset="2"/>
+              <a:buChar char="Ø"/>
+            </a:pPr>
+            <a:r>
+              <a:rPr lang="en-GB" dirty="0" smtClean="0"/>
+              <a:t>Kernel calls add a lot of overhead</a:t>
+            </a:r>
+          </a:p>
+          <a:p>
+            <a:pPr marL="285750" indent="-285750">
+              <a:buFont typeface="Wingdings" panose="05000000000000000000" pitchFamily="2" charset="2"/>
+              <a:buChar char="Ø"/>
+            </a:pPr>
+            <a:endParaRPr lang="en-GB" dirty="0"/>
+          </a:p>
+          <a:p>
+            <a:pPr marL="285750" indent="-285750">
+              <a:buFont typeface="Wingdings" panose="05000000000000000000" pitchFamily="2" charset="2"/>
+              <a:buChar char="Ø"/>
+            </a:pPr>
+            <a:endParaRPr lang="en-GB" dirty="0"/>
+          </a:p>
+        </p:txBody>
+      </p:sp>
     </p:spTree>
     <p:extLst>
       <p:ext uri="{BB962C8B-B14F-4D97-AF65-F5344CB8AC3E}">
@@ -8237,6 +7865,13 @@
   <p:clrMapOvr>
     <a:masterClrMapping/>
   </p:clrMapOvr>
+  <p:timing>
+    <p:tnLst>
+      <p:par>
+        <p:cTn id="1" dur="indefinite" restart="never" nodeType="tmRoot"/>
+      </p:par>
+    </p:tnLst>
+  </p:timing>
 </p:sld>
 </file>
 
@@ -8273,18 +7908,10 @@
           <a:lstStyle/>
           <a:p>
             <a:r>
-              <a:rPr lang="pt-PT" dirty="0" err="1"/>
-              <a:t>Conclusion</a:t>
-            </a:r>
-            <a:r>
-              <a:rPr lang="pt-PT" dirty="0"/>
-              <a:t> &amp; Future </a:t>
-            </a:r>
-            <a:r>
-              <a:rPr lang="pt-PT" dirty="0" err="1"/>
-              <a:t>Work</a:t>
-            </a:r>
-            <a:endParaRPr lang="pt-PT" dirty="0"/>
+              <a:rPr lang="en-GB" dirty="0" smtClean="0"/>
+              <a:t>Conclusion &amp; Future Work</a:t>
+            </a:r>
+            <a:endParaRPr lang="en-GB" dirty="0"/>
           </a:p>
         </p:txBody>
       </p:sp>
@@ -8309,168 +7936,24 @@
           <a:lstStyle/>
           <a:p>
             <a:r>
-              <a:rPr lang="pt-PT" dirty="0" err="1"/>
-              <a:t>Provided</a:t>
-            </a:r>
-            <a:r>
-              <a:rPr lang="pt-PT" dirty="0"/>
-              <a:t> a </a:t>
-            </a:r>
-            <a:r>
-              <a:rPr lang="pt-PT" dirty="0" err="1"/>
-              <a:t>succint</a:t>
-            </a:r>
-            <a:r>
-              <a:rPr lang="pt-PT" dirty="0"/>
-              <a:t> </a:t>
-            </a:r>
-            <a:r>
-              <a:rPr lang="pt-PT" dirty="0" err="1"/>
-              <a:t>introduction</a:t>
-            </a:r>
-            <a:r>
-              <a:rPr lang="pt-PT" dirty="0"/>
-              <a:t> to GPGPU</a:t>
+              <a:rPr lang="en-GB" dirty="0" smtClean="0"/>
+              <a:t>Provided a succinct introduction to GPGPU</a:t>
             </a:r>
           </a:p>
           <a:p>
             <a:pPr lvl="1"/>
             <a:r>
-              <a:rPr lang="pt-PT" dirty="0" err="1"/>
-              <a:t>Displayed</a:t>
-            </a:r>
-            <a:r>
-              <a:rPr lang="pt-PT" dirty="0"/>
-              <a:t> </a:t>
-            </a:r>
-            <a:r>
-              <a:rPr lang="pt-PT" dirty="0" err="1"/>
-              <a:t>the</a:t>
-            </a:r>
-            <a:r>
-              <a:rPr lang="pt-PT" dirty="0"/>
-              <a:t> some </a:t>
-            </a:r>
-            <a:r>
-              <a:rPr lang="pt-PT" dirty="0" err="1"/>
-              <a:t>of</a:t>
-            </a:r>
-            <a:r>
-              <a:rPr lang="pt-PT" dirty="0"/>
-              <a:t> </a:t>
-            </a:r>
-            <a:r>
-              <a:rPr lang="pt-PT" dirty="0" err="1"/>
-              <a:t>the</a:t>
-            </a:r>
-            <a:r>
-              <a:rPr lang="pt-PT" dirty="0"/>
-              <a:t> </a:t>
-            </a:r>
-            <a:r>
-              <a:rPr lang="pt-PT" dirty="0" err="1"/>
-              <a:t>improvements</a:t>
-            </a:r>
-            <a:r>
-              <a:rPr lang="pt-PT" dirty="0"/>
-              <a:t> </a:t>
-            </a:r>
-            <a:r>
-              <a:rPr lang="pt-PT" dirty="0" err="1"/>
-              <a:t>that</a:t>
-            </a:r>
-            <a:r>
-              <a:rPr lang="pt-PT" dirty="0"/>
-              <a:t> can </a:t>
-            </a:r>
-            <a:r>
-              <a:rPr lang="pt-PT" dirty="0" err="1"/>
-              <a:t>be</a:t>
-            </a:r>
-            <a:r>
-              <a:rPr lang="pt-PT" dirty="0"/>
-              <a:t> </a:t>
-            </a:r>
-            <a:r>
-              <a:rPr lang="pt-PT" dirty="0" err="1"/>
-              <a:t>made</a:t>
-            </a:r>
-            <a:endParaRPr lang="pt-PT" dirty="0"/>
+              <a:rPr lang="en-GB" dirty="0" smtClean="0"/>
+              <a:t>Displayed the some of the improvements that can be made</a:t>
+            </a:r>
           </a:p>
           <a:p>
             <a:pPr lvl="1"/>
             <a:r>
-              <a:rPr lang="pt-PT" dirty="0" err="1"/>
-              <a:t>Compared</a:t>
-            </a:r>
-            <a:r>
-              <a:rPr lang="pt-PT" dirty="0"/>
-              <a:t> </a:t>
-            </a:r>
-            <a:r>
-              <a:rPr lang="pt-PT" dirty="0" err="1"/>
-              <a:t>the</a:t>
-            </a:r>
-            <a:r>
-              <a:rPr lang="pt-PT" dirty="0"/>
-              <a:t> </a:t>
-            </a:r>
-            <a:r>
-              <a:rPr lang="pt-PT" dirty="0" err="1"/>
-              <a:t>results</a:t>
-            </a:r>
-            <a:r>
-              <a:rPr lang="pt-PT" dirty="0"/>
-              <a:t> in </a:t>
-            </a:r>
-            <a:r>
-              <a:rPr lang="pt-PT" dirty="0" err="1"/>
-              <a:t>order</a:t>
-            </a:r>
-            <a:r>
-              <a:rPr lang="pt-PT" dirty="0"/>
-              <a:t> to </a:t>
-            </a:r>
-            <a:r>
-              <a:rPr lang="pt-PT" dirty="0" err="1"/>
-              <a:t>demonstrate</a:t>
-            </a:r>
-            <a:r>
-              <a:rPr lang="pt-PT" dirty="0"/>
-              <a:t> </a:t>
-            </a:r>
-            <a:r>
-              <a:rPr lang="pt-PT" dirty="0" err="1"/>
-              <a:t>the</a:t>
-            </a:r>
-            <a:r>
-              <a:rPr lang="pt-PT" dirty="0"/>
-              <a:t> </a:t>
-            </a:r>
-            <a:r>
-              <a:rPr lang="pt-PT" dirty="0" err="1"/>
-              <a:t>impact</a:t>
-            </a:r>
-            <a:r>
-              <a:rPr lang="pt-PT" dirty="0"/>
-              <a:t> in </a:t>
-            </a:r>
-            <a:r>
-              <a:rPr lang="pt-PT" dirty="0" err="1"/>
-              <a:t>the</a:t>
-            </a:r>
-            <a:r>
-              <a:rPr lang="pt-PT" dirty="0"/>
-              <a:t> </a:t>
-            </a:r>
-            <a:r>
-              <a:rPr lang="pt-PT" dirty="0" err="1"/>
-              <a:t>overall</a:t>
-            </a:r>
-            <a:r>
-              <a:rPr lang="pt-PT" dirty="0"/>
-              <a:t> performance</a:t>
-            </a:r>
+              <a:rPr lang="en-GB" dirty="0" smtClean="0"/>
+              <a:t>Compared the results in order to demonstrate the impact in the overall performance</a:t>
+            </a:r>
+            <a:endParaRPr lang="en-GB" dirty="0"/>
           </a:p>
         </p:txBody>
       </p:sp>
@@ -8479,7 +7962,7 @@
           <p:cNvPr id="5" name="Content Placeholder 2">
             <a:extLst>
               <a:ext uri="{FF2B5EF4-FFF2-40B4-BE49-F238E27FC236}">
-                <a16:creationId xmlns:a16="http://schemas.microsoft.com/office/drawing/2014/main" id="{1EA0BFFF-7C66-44DF-ABF4-BD550F593C0A}"/>
+                <a16:creationId xmlns:a16="http://schemas.microsoft.com/office/drawing/2014/main" xmlns="" id="{1EA0BFFF-7C66-44DF-ABF4-BD550F593C0A}"/>
               </a:ext>
             </a:extLst>
           </p:cNvPr>
@@ -8730,37 +8213,17 @@
           </a:lstStyle>
           <a:p>
             <a:r>
-              <a:rPr lang="pt-PT" dirty="0"/>
-              <a:t>Future </a:t>
-            </a:r>
-            <a:r>
-              <a:rPr lang="pt-PT" dirty="0" err="1"/>
-              <a:t>Work</a:t>
-            </a:r>
-            <a:endParaRPr lang="pt-PT" dirty="0"/>
+              <a:rPr lang="en-GB" dirty="0" smtClean="0"/>
+              <a:t>Future Work</a:t>
+            </a:r>
           </a:p>
           <a:p>
             <a:pPr lvl="1"/>
             <a:r>
-              <a:rPr lang="pt-PT" dirty="0"/>
-              <a:t>SIMD (Single </a:t>
-            </a:r>
-            <a:r>
-              <a:rPr lang="pt-PT" dirty="0" err="1"/>
-              <a:t>Instruction</a:t>
-            </a:r>
-            <a:r>
-              <a:rPr lang="pt-PT" dirty="0"/>
-              <a:t> </a:t>
-            </a:r>
-            <a:r>
-              <a:rPr lang="pt-PT" dirty="0" err="1"/>
-              <a:t>Multiple</a:t>
-            </a:r>
-            <a:r>
-              <a:rPr lang="pt-PT" dirty="0"/>
-              <a:t> Data)</a:t>
-            </a:r>
+              <a:rPr lang="en-GB" dirty="0" smtClean="0"/>
+              <a:t>SIMD (Single Instruction Multiple Data)</a:t>
+            </a:r>
+            <a:endParaRPr lang="en-GB" dirty="0"/>
           </a:p>
         </p:txBody>
       </p:sp>
@@ -8774,6 +8237,13 @@
   <p:clrMapOvr>
     <a:masterClrMapping/>
   </p:clrMapOvr>
+  <p:timing>
+    <p:tnLst>
+      <p:par>
+        <p:cTn id="1" dur="indefinite" restart="never" nodeType="tmRoot"/>
+      </p:par>
+    </p:tnLst>
+  </p:timing>
 </p:sld>
 </file>
 

</xml_diff>

<commit_message>
Esquecime de dar commit ah apresentacao em si, esquecer ultimo commit
</commit_message>
<xml_diff>
--- a/presentation.pptx
+++ b/presentation.pptx
@@ -203,7 +203,7 @@
           <a:p>
             <a:fld id="{326EF429-66A5-4A84-8434-4D09066A8E33}" type="datetimeFigureOut">
               <a:rPr lang="pt-PT" smtClean="0"/>
-              <a:t>26/01/2020</a:t>
+              <a:t>27/01/2020</a:t>
             </a:fld>
             <a:endParaRPr lang="pt-PT"/>
           </a:p>
@@ -362,7 +362,7 @@
           <a:p>
             <a:fld id="{3E4499F5-70C7-4B80-98E9-84E6A0F06D73}" type="slidenum">
               <a:rPr lang="pt-PT" smtClean="0"/>
-              <a:t>‹#›</a:t>
+              <a:t>‹nº›</a:t>
             </a:fld>
             <a:endParaRPr lang="pt-PT"/>
           </a:p>
@@ -1443,7 +1443,7 @@
           <a:p>
             <a:fld id="{4AAD347D-5ACD-4C99-B74B-A9C85AD731AF}" type="datetimeFigureOut">
               <a:rPr lang="en-US" dirty="0"/>
-              <a:t>1/26/2020</a:t>
+              <a:t>1/27/2020</a:t>
             </a:fld>
             <a:endParaRPr lang="en-US" dirty="0"/>
           </a:p>
@@ -1485,7 +1485,7 @@
           <a:p>
             <a:fld id="{D57F1E4F-1CFF-5643-939E-02111984F565}" type="slidenum">
               <a:rPr lang="en-US" dirty="0"/>
-              <a:t>‹#›</a:t>
+              <a:t>‹nº›</a:t>
             </a:fld>
             <a:endParaRPr lang="en-US" dirty="0"/>
           </a:p>
@@ -1713,7 +1713,7 @@
           <a:p>
             <a:fld id="{4509A250-FF31-4206-8172-F9D3106AACB1}" type="datetimeFigureOut">
               <a:rPr lang="en-US" dirty="0"/>
-              <a:t>1/26/2020</a:t>
+              <a:t>1/27/2020</a:t>
             </a:fld>
             <a:endParaRPr lang="en-US" dirty="0"/>
           </a:p>
@@ -1755,7 +1755,7 @@
           <a:p>
             <a:fld id="{D57F1E4F-1CFF-5643-939E-02111984F565}" type="slidenum">
               <a:rPr lang="en-US" dirty="0"/>
-              <a:t>‹#›</a:t>
+              <a:t>‹nº›</a:t>
             </a:fld>
             <a:endParaRPr lang="en-US" dirty="0"/>
           </a:p>
@@ -1902,7 +1902,7 @@
           <a:p>
             <a:fld id="{4509A250-FF31-4206-8172-F9D3106AACB1}" type="datetimeFigureOut">
               <a:rPr lang="en-US" dirty="0"/>
-              <a:t>1/26/2020</a:t>
+              <a:t>1/27/2020</a:t>
             </a:fld>
             <a:endParaRPr lang="en-US" dirty="0"/>
           </a:p>
@@ -1944,7 +1944,7 @@
           <a:p>
             <a:fld id="{D57F1E4F-1CFF-5643-939E-02111984F565}" type="slidenum">
               <a:rPr lang="en-US" dirty="0"/>
-              <a:t>‹#›</a:t>
+              <a:t>‹nº›</a:t>
             </a:fld>
             <a:endParaRPr lang="en-US" dirty="0"/>
           </a:p>
@@ -2170,7 +2170,7 @@
           <a:p>
             <a:fld id="{4509A250-FF31-4206-8172-F9D3106AACB1}" type="datetimeFigureOut">
               <a:rPr lang="en-US" dirty="0"/>
-              <a:t>1/26/2020</a:t>
+              <a:t>1/27/2020</a:t>
             </a:fld>
             <a:endParaRPr lang="en-US" dirty="0"/>
           </a:p>
@@ -2212,7 +2212,7 @@
           <a:p>
             <a:fld id="{D57F1E4F-1CFF-5643-939E-02111984F565}" type="slidenum">
               <a:rPr lang="en-US" dirty="0"/>
-              <a:t>‹#›</a:t>
+              <a:t>‹nº›</a:t>
             </a:fld>
             <a:endParaRPr lang="en-US" dirty="0"/>
           </a:p>
@@ -2506,7 +2506,7 @@
           <a:p>
             <a:fld id="{4509A250-FF31-4206-8172-F9D3106AACB1}" type="datetimeFigureOut">
               <a:rPr lang="en-US" dirty="0"/>
-              <a:t>1/26/2020</a:t>
+              <a:t>1/27/2020</a:t>
             </a:fld>
             <a:endParaRPr lang="en-US" dirty="0"/>
           </a:p>
@@ -2548,7 +2548,7 @@
           <a:p>
             <a:fld id="{D57F1E4F-1CFF-5643-939E-02111984F565}" type="slidenum">
               <a:rPr lang="en-US" dirty="0"/>
-              <a:t>‹#›</a:t>
+              <a:t>‹nº›</a:t>
             </a:fld>
             <a:endParaRPr lang="en-US" dirty="0"/>
           </a:p>
@@ -3124,7 +3124,7 @@
           <a:p>
             <a:fld id="{4509A250-FF31-4206-8172-F9D3106AACB1}" type="datetimeFigureOut">
               <a:rPr lang="en-US" dirty="0"/>
-              <a:t>1/26/2020</a:t>
+              <a:t>1/27/2020</a:t>
             </a:fld>
             <a:endParaRPr lang="en-US" dirty="0"/>
           </a:p>
@@ -3166,7 +3166,7 @@
           <a:p>
             <a:fld id="{D57F1E4F-1CFF-5643-939E-02111984F565}" type="slidenum">
               <a:rPr lang="en-US" dirty="0"/>
-              <a:t>‹#›</a:t>
+              <a:t>‹nº›</a:t>
             </a:fld>
             <a:endParaRPr lang="en-US" dirty="0"/>
           </a:p>
@@ -3979,7 +3979,7 @@
           <a:p>
             <a:fld id="{4509A250-FF31-4206-8172-F9D3106AACB1}" type="datetimeFigureOut">
               <a:rPr lang="en-US" dirty="0"/>
-              <a:t>1/26/2020</a:t>
+              <a:t>1/27/2020</a:t>
             </a:fld>
             <a:endParaRPr lang="en-US" dirty="0"/>
           </a:p>
@@ -4021,7 +4021,7 @@
           <a:p>
             <a:fld id="{D57F1E4F-1CFF-5643-939E-02111984F565}" type="slidenum">
               <a:rPr lang="en-US" dirty="0"/>
-              <a:t>‹#›</a:t>
+              <a:t>‹nº›</a:t>
             </a:fld>
             <a:endParaRPr lang="en-US" dirty="0"/>
           </a:p>
@@ -4144,7 +4144,7 @@
           <a:p>
             <a:fld id="{4509A250-FF31-4206-8172-F9D3106AACB1}" type="datetimeFigureOut">
               <a:rPr lang="en-US" dirty="0"/>
-              <a:t>1/26/2020</a:t>
+              <a:t>1/27/2020</a:t>
             </a:fld>
             <a:endParaRPr lang="en-US" dirty="0"/>
           </a:p>
@@ -4186,7 +4186,7 @@
           <a:p>
             <a:fld id="{D57F1E4F-1CFF-5643-939E-02111984F565}" type="slidenum">
               <a:rPr lang="en-US" dirty="0"/>
-              <a:t>‹#›</a:t>
+              <a:t>‹nº›</a:t>
             </a:fld>
             <a:endParaRPr lang="en-US" dirty="0"/>
           </a:p>
@@ -4319,7 +4319,7 @@
           <a:p>
             <a:fld id="{4509A250-FF31-4206-8172-F9D3106AACB1}" type="datetimeFigureOut">
               <a:rPr lang="en-US" dirty="0"/>
-              <a:t>1/26/2020</a:t>
+              <a:t>1/27/2020</a:t>
             </a:fld>
             <a:endParaRPr lang="en-US" dirty="0"/>
           </a:p>
@@ -4361,7 +4361,7 @@
           <a:p>
             <a:fld id="{D57F1E4F-1CFF-5643-939E-02111984F565}" type="slidenum">
               <a:rPr lang="en-US" dirty="0"/>
-              <a:t>‹#›</a:t>
+              <a:t>‹nº›</a:t>
             </a:fld>
             <a:endParaRPr lang="en-US" dirty="0"/>
           </a:p>
@@ -4484,7 +4484,7 @@
           <a:p>
             <a:fld id="{4509A250-FF31-4206-8172-F9D3106AACB1}" type="datetimeFigureOut">
               <a:rPr lang="en-US" dirty="0"/>
-              <a:t>1/26/2020</a:t>
+              <a:t>1/27/2020</a:t>
             </a:fld>
             <a:endParaRPr lang="en-US" dirty="0"/>
           </a:p>
@@ -4526,7 +4526,7 @@
           <a:p>
             <a:fld id="{D57F1E4F-1CFF-5643-939E-02111984F565}" type="slidenum">
               <a:rPr lang="en-US" dirty="0"/>
-              <a:t>‹#›</a:t>
+              <a:t>‹nº›</a:t>
             </a:fld>
             <a:endParaRPr lang="en-US" dirty="0"/>
           </a:p>
@@ -4726,7 +4726,7 @@
           <a:p>
             <a:fld id="{9796027F-7875-4030-9381-8BD8C4F21935}" type="datetimeFigureOut">
               <a:rPr lang="en-US" dirty="0"/>
-              <a:t>1/26/2020</a:t>
+              <a:t>1/27/2020</a:t>
             </a:fld>
             <a:endParaRPr lang="en-US" dirty="0"/>
           </a:p>
@@ -4768,7 +4768,7 @@
           <a:p>
             <a:fld id="{D57F1E4F-1CFF-5643-939E-02111984F565}" type="slidenum">
               <a:rPr lang="en-US" dirty="0"/>
-              <a:t>‹#›</a:t>
+              <a:t>‹nº›</a:t>
             </a:fld>
             <a:endParaRPr lang="en-US" dirty="0"/>
           </a:p>
@@ -5013,7 +5013,7 @@
           <a:p>
             <a:fld id="{9796027F-7875-4030-9381-8BD8C4F21935}" type="datetimeFigureOut">
               <a:rPr lang="en-US" dirty="0"/>
-              <a:t>1/26/2020</a:t>
+              <a:t>1/27/2020</a:t>
             </a:fld>
             <a:endParaRPr lang="en-US" dirty="0"/>
           </a:p>
@@ -5055,7 +5055,7 @@
           <a:p>
             <a:fld id="{D57F1E4F-1CFF-5643-939E-02111984F565}" type="slidenum">
               <a:rPr lang="en-US" dirty="0"/>
-              <a:t>‹#›</a:t>
+              <a:t>‹nº›</a:t>
             </a:fld>
             <a:endParaRPr lang="en-US" dirty="0"/>
           </a:p>
@@ -5452,7 +5452,7 @@
           <a:p>
             <a:fld id="{9796027F-7875-4030-9381-8BD8C4F21935}" type="datetimeFigureOut">
               <a:rPr lang="en-US" dirty="0"/>
-              <a:t>1/26/2020</a:t>
+              <a:t>1/27/2020</a:t>
             </a:fld>
             <a:endParaRPr lang="en-US" dirty="0"/>
           </a:p>
@@ -5494,7 +5494,7 @@
           <a:p>
             <a:fld id="{D57F1E4F-1CFF-5643-939E-02111984F565}" type="slidenum">
               <a:rPr lang="en-US" dirty="0"/>
-              <a:t>‹#›</a:t>
+              <a:t>‹nº›</a:t>
             </a:fld>
             <a:endParaRPr lang="en-US" dirty="0"/>
           </a:p>
@@ -5565,7 +5565,7 @@
           <a:p>
             <a:fld id="{4509A250-FF31-4206-8172-F9D3106AACB1}" type="datetimeFigureOut">
               <a:rPr lang="en-US" dirty="0"/>
-              <a:t>1/26/2020</a:t>
+              <a:t>1/27/2020</a:t>
             </a:fld>
             <a:endParaRPr lang="en-US" dirty="0"/>
           </a:p>
@@ -5607,7 +5607,7 @@
           <a:p>
             <a:fld id="{D57F1E4F-1CFF-5643-939E-02111984F565}" type="slidenum">
               <a:rPr lang="en-US" dirty="0"/>
-              <a:t>‹#›</a:t>
+              <a:t>‹nº›</a:t>
             </a:fld>
             <a:endParaRPr lang="en-US" dirty="0"/>
           </a:p>
@@ -5655,7 +5655,7 @@
           <a:p>
             <a:fld id="{4509A250-FF31-4206-8172-F9D3106AACB1}" type="datetimeFigureOut">
               <a:rPr lang="en-US" dirty="0"/>
-              <a:t>1/26/2020</a:t>
+              <a:t>1/27/2020</a:t>
             </a:fld>
             <a:endParaRPr lang="en-US" dirty="0"/>
           </a:p>
@@ -5697,7 +5697,7 @@
           <a:p>
             <a:fld id="{D57F1E4F-1CFF-5643-939E-02111984F565}" type="slidenum">
               <a:rPr lang="en-US" dirty="0"/>
-              <a:t>‹#›</a:t>
+              <a:t>‹nº›</a:t>
             </a:fld>
             <a:endParaRPr lang="en-US" dirty="0"/>
           </a:p>
@@ -5929,7 +5929,7 @@
           <a:p>
             <a:fld id="{4509A250-FF31-4206-8172-F9D3106AACB1}" type="datetimeFigureOut">
               <a:rPr lang="en-US" dirty="0"/>
-              <a:t>1/26/2020</a:t>
+              <a:t>1/27/2020</a:t>
             </a:fld>
             <a:endParaRPr lang="en-US" dirty="0"/>
           </a:p>
@@ -5971,7 +5971,7 @@
           <a:p>
             <a:fld id="{D57F1E4F-1CFF-5643-939E-02111984F565}" type="slidenum">
               <a:rPr lang="en-US" dirty="0"/>
-              <a:t>‹#›</a:t>
+              <a:t>‹nº›</a:t>
             </a:fld>
             <a:endParaRPr lang="en-US" dirty="0"/>
           </a:p>
@@ -6199,7 +6199,7 @@
           <a:p>
             <a:fld id="{4509A250-FF31-4206-8172-F9D3106AACB1}" type="datetimeFigureOut">
               <a:rPr lang="en-US" dirty="0"/>
-              <a:t>1/26/2020</a:t>
+              <a:t>1/27/2020</a:t>
             </a:fld>
             <a:endParaRPr lang="en-US" dirty="0"/>
           </a:p>
@@ -6241,7 +6241,7 @@
           <a:p>
             <a:fld id="{D57F1E4F-1CFF-5643-939E-02111984F565}" type="slidenum">
               <a:rPr lang="en-US" dirty="0"/>
-              <a:t>‹#›</a:t>
+              <a:t>‹nº›</a:t>
             </a:fld>
             <a:endParaRPr lang="en-US" dirty="0"/>
           </a:p>
@@ -6623,7 +6623,7 @@
           <a:p>
             <a:fld id="{4AAD347D-5ACD-4C99-B74B-A9C85AD731AF}" type="datetimeFigureOut">
               <a:rPr lang="en-US" dirty="0"/>
-              <a:t>1/26/2020</a:t>
+              <a:t>1/27/2020</a:t>
             </a:fld>
             <a:endParaRPr lang="en-US" dirty="0"/>
           </a:p>
@@ -6702,7 +6702,7 @@
           <a:p>
             <a:fld id="{D57F1E4F-1CFF-5643-939E-02111984F565}" type="slidenum">
               <a:rPr lang="en-US" dirty="0"/>
-              <a:t>‹#›</a:t>
+              <a:t>‹nº›</a:t>
             </a:fld>
             <a:endParaRPr lang="en-US" dirty="0"/>
           </a:p>
@@ -7169,26 +7169,14 @@
           <a:p>
             <a:r>
               <a:rPr lang="en-GB" sz="5400" dirty="0"/>
-              <a:t>Optimizations in </a:t>
-            </a:r>
-            <a:r>
-              <a:rPr lang="en-GB" sz="5400" dirty="0" smtClean="0"/>
-              <a:t>GPGPU</a:t>
+              <a:t>Optimizations in GPGPU</a:t>
             </a:r>
             <a:br>
-              <a:rPr lang="en-GB" sz="5400" dirty="0" smtClean="0"/>
+              <a:rPr lang="en-GB" sz="5400" dirty="0"/>
             </a:br>
             <a:r>
-              <a:rPr lang="en-GB" sz="5400" dirty="0" smtClean="0"/>
-              <a:t>using</a:t>
-            </a:r>
-            <a:r>
               <a:rPr lang="en-GB" sz="5400" dirty="0"/>
-              <a:t> </a:t>
-            </a:r>
-            <a:r>
-              <a:rPr lang="en-GB" sz="5400" dirty="0" smtClean="0"/>
-              <a:t>Floyd-Warshall</a:t>
+              <a:t>using Floyd-Warshall</a:t>
             </a:r>
             <a:endParaRPr lang="pt-PT" sz="6600" dirty="0"/>
           </a:p>
@@ -7222,13 +7210,8 @@
           <a:p>
             <a:r>
               <a:rPr lang="pt-PT" dirty="0"/>
-              <a:t>Vasco Ferreira, </a:t>
-            </a:r>
-            <a:r>
-              <a:rPr lang="pt-PT" dirty="0" smtClean="0"/>
-              <a:t>nº49470</a:t>
-            </a:r>
-            <a:endParaRPr lang="pt-PT" dirty="0"/>
+              <a:t>Vasco Ferreira, nº49470</a:t>
+            </a:r>
           </a:p>
         </p:txBody>
       </p:sp>
@@ -7237,7 +7220,7 @@
           <p:cNvPr id="12" name="Agrupar 11">
             <a:extLst>
               <a:ext uri="{FF2B5EF4-FFF2-40B4-BE49-F238E27FC236}">
-                <a16:creationId xmlns="" xmlns:a16="http://schemas.microsoft.com/office/drawing/2014/main" id="{FC2A7235-27BF-4464-89A0-E61C0CC8C7ED}"/>
+                <a16:creationId xmlns:a16="http://schemas.microsoft.com/office/drawing/2014/main" id="{FC2A7235-27BF-4464-89A0-E61C0CC8C7ED}"/>
               </a:ext>
             </a:extLst>
           </p:cNvPr>
@@ -7257,7 +7240,7 @@
             <p:cNvPr id="7" name="Retângulo 6">
               <a:extLst>
                 <a:ext uri="{FF2B5EF4-FFF2-40B4-BE49-F238E27FC236}">
-                  <a16:creationId xmlns="" xmlns:a16="http://schemas.microsoft.com/office/drawing/2014/main" id="{3536D763-8F7F-4299-BF1F-2F4700353BE9}"/>
+                  <a16:creationId xmlns:a16="http://schemas.microsoft.com/office/drawing/2014/main" id="{3536D763-8F7F-4299-BF1F-2F4700353BE9}"/>
                 </a:ext>
               </a:extLst>
             </p:cNvPr>
@@ -7311,7 +7294,7 @@
             <p:cNvPr id="10" name="Imagem 9">
               <a:extLst>
                 <a:ext uri="{FF2B5EF4-FFF2-40B4-BE49-F238E27FC236}">
-                  <a16:creationId xmlns="" xmlns:a16="http://schemas.microsoft.com/office/drawing/2014/main" id="{EE120ED8-F510-428F-8E2B-8FB7801ED686}"/>
+                  <a16:creationId xmlns:a16="http://schemas.microsoft.com/office/drawing/2014/main" id="{EE120ED8-F510-428F-8E2B-8FB7801ED686}"/>
                 </a:ext>
               </a:extLst>
             </p:cNvPr>
@@ -7342,7 +7325,7 @@
           <p:cNvPr id="11" name="CaixaDeTexto 10">
             <a:extLst>
               <a:ext uri="{FF2B5EF4-FFF2-40B4-BE49-F238E27FC236}">
-                <a16:creationId xmlns="" xmlns:a16="http://schemas.microsoft.com/office/drawing/2014/main" id="{B56E9F45-F09B-4BD0-98B3-EC2ADC5C4F07}"/>
+                <a16:creationId xmlns:a16="http://schemas.microsoft.com/office/drawing/2014/main" id="{B56E9F45-F09B-4BD0-98B3-EC2ADC5C4F07}"/>
               </a:ext>
             </a:extLst>
           </p:cNvPr>
@@ -7450,7 +7433,7 @@
           <p:cNvPr id="4" name="Marcador de Posição do Texto 3">
             <a:extLst>
               <a:ext uri="{FF2B5EF4-FFF2-40B4-BE49-F238E27FC236}">
-                <a16:creationId xmlns="" xmlns:a16="http://schemas.microsoft.com/office/drawing/2014/main" id="{395FDA90-928D-490B-9205-8969FC300942}"/>
+                <a16:creationId xmlns:a16="http://schemas.microsoft.com/office/drawing/2014/main" id="{395FDA90-928D-490B-9205-8969FC300942}"/>
               </a:ext>
             </a:extLst>
           </p:cNvPr>
@@ -7512,7 +7495,7 @@
           <p:cNvPr id="5" name="Marcador de Posição do Texto 4">
             <a:extLst>
               <a:ext uri="{FF2B5EF4-FFF2-40B4-BE49-F238E27FC236}">
-                <a16:creationId xmlns="" xmlns:a16="http://schemas.microsoft.com/office/drawing/2014/main" id="{B606F5B3-55F1-4AF6-93F1-FAC926D4A149}"/>
+                <a16:creationId xmlns:a16="http://schemas.microsoft.com/office/drawing/2014/main" id="{B606F5B3-55F1-4AF6-93F1-FAC926D4A149}"/>
               </a:ext>
             </a:extLst>
           </p:cNvPr>
@@ -7544,7 +7527,7 @@
           <p:cNvPr id="6" name="Marcador de Posição de Conteúdo 5">
             <a:extLst>
               <a:ext uri="{FF2B5EF4-FFF2-40B4-BE49-F238E27FC236}">
-                <a16:creationId xmlns="" xmlns:a16="http://schemas.microsoft.com/office/drawing/2014/main" id="{8B8A2FC8-CFF6-4995-AE1C-CB0B7BDB5770}"/>
+                <a16:creationId xmlns:a16="http://schemas.microsoft.com/office/drawing/2014/main" id="{8B8A2FC8-CFF6-4995-AE1C-CB0B7BDB5770}"/>
               </a:ext>
             </a:extLst>
           </p:cNvPr>
@@ -7837,7 +7820,7 @@
         </p:nvSpPr>
         <p:spPr>
           <a:xfrm>
-            <a:off x="6610413" y="3175271"/>
+            <a:off x="7041414" y="2974159"/>
             <a:ext cx="4382530" cy="1200329"/>
           </a:xfrm>
           <a:prstGeom prst="rect">
@@ -7856,24 +7839,8 @@
               <a:buChar char="Ø"/>
             </a:pPr>
             <a:r>
-              <a:rPr lang="en-GB" dirty="0" smtClean="0"/>
-              <a:t>Major </a:t>
-            </a:r>
-            <a:r>
               <a:rPr lang="en-GB" dirty="0"/>
-              <a:t>speedup </a:t>
-            </a:r>
-            <a:r>
-              <a:rPr lang="en-GB" dirty="0" smtClean="0"/>
-              <a:t>when </a:t>
-            </a:r>
-            <a:r>
-              <a:rPr lang="en-GB" dirty="0"/>
-              <a:t>running the algorithm in </a:t>
-            </a:r>
-            <a:r>
-              <a:rPr lang="en-GB" dirty="0" smtClean="0"/>
-              <a:t>the parallel GPU</a:t>
+              <a:t>Major speedup when running the algorithm in the parallel GPU</a:t>
             </a:r>
           </a:p>
           <a:p>
@@ -7890,13 +7857,8 @@
             </a:pPr>
             <a:r>
               <a:rPr lang="en-GB" dirty="0"/>
-              <a:t>Speedup of around </a:t>
-            </a:r>
-            <a:r>
-              <a:rPr lang="en-GB" dirty="0" smtClean="0"/>
-              <a:t>7.2</a:t>
-            </a:r>
-            <a:endParaRPr lang="en-GB" dirty="0"/>
+              <a:t>Speedup of around 7.2</a:t>
+            </a:r>
           </a:p>
         </p:txBody>
       </p:sp>
@@ -7905,12 +7867,12 @@
           <p:cNvPr id="8" name="Marcador de Posição de Conteúdo 7" descr="Uma imagem com captura de ecrã, porta&#10;&#10;Descrição gerada automaticamente">
             <a:extLst>
               <a:ext uri="{FF2B5EF4-FFF2-40B4-BE49-F238E27FC236}">
-                <a16:creationId xmlns="" xmlns:a16="http://schemas.microsoft.com/office/drawing/2014/main" id="{094E9226-C054-4156-B9B1-2AF9E15FF461}"/>
+                <a16:creationId xmlns:a16="http://schemas.microsoft.com/office/drawing/2014/main" id="{094E9226-C054-4156-B9B1-2AF9E15FF461}"/>
               </a:ext>
             </a:extLst>
           </p:cNvPr>
           <p:cNvPicPr>
-            <a:picLocks noGrp="1" noChangeAspect="1"/>
+            <a:picLocks noGrp="1"/>
           </p:cNvPicPr>
           <p:nvPr>
             <p:ph idx="1"/>
@@ -7924,8 +7886,8 @@
         </p:blipFill>
         <p:spPr>
           <a:xfrm>
-            <a:off x="646111" y="2289853"/>
-            <a:ext cx="5282610" cy="2971167"/>
+            <a:off x="646111" y="1697400"/>
+            <a:ext cx="6120000" cy="3463200"/>
           </a:xfrm>
         </p:spPr>
       </p:pic>
@@ -7987,12 +7949,12 @@
           <p:cNvPr id="10" name="Imagem 9" descr="Uma imagem com porta, sala, computador&#10;&#10;Descrição gerada automaticamente">
             <a:extLst>
               <a:ext uri="{FF2B5EF4-FFF2-40B4-BE49-F238E27FC236}">
-                <a16:creationId xmlns="" xmlns:a16="http://schemas.microsoft.com/office/drawing/2014/main" id="{F7C143F8-9777-4972-9A40-AE63D1501B25}"/>
+                <a16:creationId xmlns:a16="http://schemas.microsoft.com/office/drawing/2014/main" id="{F7C143F8-9777-4972-9A40-AE63D1501B25}"/>
               </a:ext>
             </a:extLst>
           </p:cNvPr>
           <p:cNvPicPr>
-            <a:picLocks noChangeAspect="1"/>
+            <a:picLocks/>
           </p:cNvPicPr>
           <p:nvPr/>
         </p:nvPicPr>
@@ -8004,8 +7966,8 @@
         </p:blipFill>
         <p:spPr>
           <a:xfrm>
-            <a:off x="646111" y="2478745"/>
-            <a:ext cx="5083478" cy="2971166"/>
+            <a:off x="646111" y="1697685"/>
+            <a:ext cx="6120000" cy="3462629"/>
           </a:xfrm>
           <a:prstGeom prst="rect">
             <a:avLst/>
@@ -8017,7 +7979,7 @@
           <p:cNvPr id="12" name="TextBox 2">
             <a:extLst>
               <a:ext uri="{FF2B5EF4-FFF2-40B4-BE49-F238E27FC236}">
-                <a16:creationId xmlns="" xmlns:a16="http://schemas.microsoft.com/office/drawing/2014/main" id="{BE145911-E595-430E-BA1D-3AB904E33A9F}"/>
+                <a16:creationId xmlns:a16="http://schemas.microsoft.com/office/drawing/2014/main" id="{BE145911-E595-430E-BA1D-3AB904E33A9F}"/>
               </a:ext>
             </a:extLst>
           </p:cNvPr>
@@ -8026,8 +7988,8 @@
         </p:nvSpPr>
         <p:spPr>
           <a:xfrm>
-            <a:off x="6176796" y="3087165"/>
-            <a:ext cx="5083478" cy="1754326"/>
+            <a:off x="7021750" y="2568899"/>
+            <a:ext cx="4779778" cy="2031325"/>
           </a:xfrm>
           <a:prstGeom prst="rect">
             <a:avLst/>
@@ -8046,11 +8008,7 @@
             </a:pPr>
             <a:r>
               <a:rPr lang="en-GB" dirty="0"/>
-              <a:t>Between implementations we can see a speedup of 1.76 and </a:t>
-            </a:r>
-            <a:r>
-              <a:rPr lang="en-GB" dirty="0" smtClean="0"/>
-              <a:t>1.19</a:t>
+              <a:t>Between implementations we can see a speedup of 1.76 and 1.19</a:t>
             </a:r>
           </a:p>
           <a:p>
@@ -8066,24 +8024,8 @@
               <a:buChar char="Ø"/>
             </a:pPr>
             <a:r>
-              <a:rPr lang="en-GB" dirty="0" smtClean="0"/>
-              <a:t>Speedup </a:t>
-            </a:r>
-            <a:r>
               <a:rPr lang="en-GB" dirty="0"/>
-              <a:t>can be improved to </a:t>
-            </a:r>
-            <a:r>
-              <a:rPr lang="en-GB" dirty="0" smtClean="0"/>
-              <a:t>approximately </a:t>
-            </a:r>
-            <a:r>
-              <a:rPr lang="en-GB" dirty="0"/>
-              <a:t>12.6 by adding atomic and to 15.1 by improving memory </a:t>
-            </a:r>
-            <a:r>
-              <a:rPr lang="en-GB" dirty="0" smtClean="0"/>
-              <a:t>usage</a:t>
+              <a:t>Speedup can be improved to approximately 12.6 by adding atomic and to 15.1 by improving memory usage</a:t>
             </a:r>
           </a:p>
         </p:txBody>
@@ -8186,7 +8128,7 @@
           <p:cNvPr id="5" name="Content Placeholder 2">
             <a:extLst>
               <a:ext uri="{FF2B5EF4-FFF2-40B4-BE49-F238E27FC236}">
-                <a16:creationId xmlns="" xmlns:a16="http://schemas.microsoft.com/office/drawing/2014/main" id="{1EA0BFFF-7C66-44DF-ABF4-BD550F593C0A}"/>
+                <a16:creationId xmlns:a16="http://schemas.microsoft.com/office/drawing/2014/main" id="{1EA0BFFF-7C66-44DF-ABF4-BD550F593C0A}"/>
               </a:ext>
             </a:extLst>
           </p:cNvPr>

</xml_diff>